<commit_message>
final test case and powerpoint video embedded
</commit_message>
<xml_diff>
--- a/powerpoint.pptx
+++ b/powerpoint.pptx
@@ -113,6 +113,22 @@
       </a:defRPr>
     </a:lvl9pPr>
   </p:defaultTextStyle>
+  <p:extLst>
+    <p:ext uri="{EFAFB233-063F-42B5-8137-9DF3F51BA10A}">
+      <p15:sldGuideLst xmlns:p15="http://schemas.microsoft.com/office/powerpoint/2012/main">
+        <p15:guide id="1" orient="horz" pos="2160">
+          <p15:clr>
+            <a:srgbClr val="A4A3A4"/>
+          </p15:clr>
+        </p15:guide>
+        <p15:guide id="2" pos="2880">
+          <p15:clr>
+            <a:srgbClr val="A4A3A4"/>
+          </p15:clr>
+        </p15:guide>
+      </p15:sldGuideLst>
+    </p:ext>
+  </p:extLst>
 </p:presentation>
 </file>
 
@@ -203,10 +219,9 @@
           </a:lstStyle>
           <a:p>
             <a:r>
-              <a:rPr kumimoji="0" lang="en-US" smtClean="0"/>
+              <a:rPr kumimoji="0" lang="en-US"/>
               <a:t>Click to edit Master title style</a:t>
             </a:r>
-            <a:endParaRPr kumimoji="0" lang="en-US"/>
           </a:p>
         </p:txBody>
       </p:sp>
@@ -227,7 +242,7 @@
           <a:p>
             <a:fld id="{0D5F8F7A-EA9B-45B0-BFD1-6C644FFD855C}" type="datetimeFigureOut">
               <a:rPr lang="en-PH" smtClean="0"/>
-              <a:t>19/11/2020</a:t>
+              <a:t>01/12/2020</a:t>
             </a:fld>
             <a:endParaRPr lang="en-PH"/>
           </a:p>
@@ -329,10 +344,9 @@
           </a:lstStyle>
           <a:p>
             <a:r>
-              <a:rPr kumimoji="0" lang="en-US" smtClean="0"/>
+              <a:rPr kumimoji="0" lang="en-US"/>
               <a:t>Click to edit Master subtitle style</a:t>
             </a:r>
-            <a:endParaRPr kumimoji="0" lang="en-US"/>
           </a:p>
         </p:txBody>
       </p:sp>
@@ -341,13 +355,6 @@
   <p:clrMapOvr>
     <a:masterClrMapping/>
   </p:clrMapOvr>
-  <p:timing>
-    <p:tnLst>
-      <p:par>
-        <p:cTn id="1" dur="indefinite" restart="never" nodeType="tmRoot"/>
-      </p:par>
-    </p:tnLst>
-  </p:timing>
 </p:sldLayout>
 </file>
 
@@ -384,10 +391,9 @@
           <a:lstStyle/>
           <a:p>
             <a:r>
-              <a:rPr kumimoji="0" lang="en-US" smtClean="0"/>
+              <a:rPr kumimoji="0" lang="en-US"/>
               <a:t>Click to edit Master title style</a:t>
             </a:r>
-            <a:endParaRPr kumimoji="0" lang="en-US"/>
           </a:p>
         </p:txBody>
       </p:sp>
@@ -408,35 +414,35 @@
           <a:p>
             <a:pPr lvl="0" eaLnBrk="1" latinLnBrk="0" hangingPunct="1"/>
             <a:r>
-              <a:rPr lang="en-US" smtClean="0"/>
+              <a:rPr lang="en-US"/>
               <a:t>Click to edit Master text styles</a:t>
             </a:r>
           </a:p>
           <a:p>
             <a:pPr lvl="1" eaLnBrk="1" latinLnBrk="0" hangingPunct="1"/>
             <a:r>
-              <a:rPr lang="en-US" smtClean="0"/>
+              <a:rPr lang="en-US"/>
               <a:t>Second level</a:t>
             </a:r>
           </a:p>
           <a:p>
             <a:pPr lvl="2" eaLnBrk="1" latinLnBrk="0" hangingPunct="1"/>
             <a:r>
-              <a:rPr lang="en-US" smtClean="0"/>
+              <a:rPr lang="en-US"/>
               <a:t>Third level</a:t>
             </a:r>
           </a:p>
           <a:p>
             <a:pPr lvl="3" eaLnBrk="1" latinLnBrk="0" hangingPunct="1"/>
             <a:r>
-              <a:rPr lang="en-US" smtClean="0"/>
+              <a:rPr lang="en-US"/>
               <a:t>Fourth level</a:t>
             </a:r>
           </a:p>
           <a:p>
             <a:pPr lvl="4" eaLnBrk="1" latinLnBrk="0" hangingPunct="1"/>
             <a:r>
-              <a:rPr lang="en-US" smtClean="0"/>
+              <a:rPr lang="en-US"/>
               <a:t>Fifth level</a:t>
             </a:r>
             <a:endParaRPr kumimoji="0" lang="en-US"/>
@@ -460,7 +466,7 @@
           <a:p>
             <a:fld id="{0D5F8F7A-EA9B-45B0-BFD1-6C644FFD855C}" type="datetimeFigureOut">
               <a:rPr lang="en-PH" smtClean="0"/>
-              <a:t>19/11/2020</a:t>
+              <a:t>01/12/2020</a:t>
             </a:fld>
             <a:endParaRPr lang="en-PH"/>
           </a:p>
@@ -513,13 +519,6 @@
   <p:clrMapOvr>
     <a:masterClrMapping/>
   </p:clrMapOvr>
-  <p:timing>
-    <p:tnLst>
-      <p:par>
-        <p:cTn id="1" dur="indefinite" restart="never" nodeType="tmRoot"/>
-      </p:par>
-    </p:tnLst>
-  </p:timing>
 </p:sldLayout>
 </file>
 
@@ -561,10 +560,9 @@
           <a:lstStyle/>
           <a:p>
             <a:r>
-              <a:rPr kumimoji="0" lang="en-US" smtClean="0"/>
+              <a:rPr kumimoji="0" lang="en-US"/>
               <a:t>Click to edit Master title style</a:t>
             </a:r>
-            <a:endParaRPr kumimoji="0" lang="en-US"/>
           </a:p>
         </p:txBody>
       </p:sp>
@@ -590,35 +588,35 @@
           <a:p>
             <a:pPr lvl="0" eaLnBrk="1" latinLnBrk="0" hangingPunct="1"/>
             <a:r>
-              <a:rPr lang="en-US" smtClean="0"/>
+              <a:rPr lang="en-US"/>
               <a:t>Click to edit Master text styles</a:t>
             </a:r>
           </a:p>
           <a:p>
             <a:pPr lvl="1" eaLnBrk="1" latinLnBrk="0" hangingPunct="1"/>
             <a:r>
-              <a:rPr lang="en-US" smtClean="0"/>
+              <a:rPr lang="en-US"/>
               <a:t>Second level</a:t>
             </a:r>
           </a:p>
           <a:p>
             <a:pPr lvl="2" eaLnBrk="1" latinLnBrk="0" hangingPunct="1"/>
             <a:r>
-              <a:rPr lang="en-US" smtClean="0"/>
+              <a:rPr lang="en-US"/>
               <a:t>Third level</a:t>
             </a:r>
           </a:p>
           <a:p>
             <a:pPr lvl="3" eaLnBrk="1" latinLnBrk="0" hangingPunct="1"/>
             <a:r>
-              <a:rPr lang="en-US" smtClean="0"/>
+              <a:rPr lang="en-US"/>
               <a:t>Fourth level</a:t>
             </a:r>
           </a:p>
           <a:p>
             <a:pPr lvl="4" eaLnBrk="1" latinLnBrk="0" hangingPunct="1"/>
             <a:r>
-              <a:rPr lang="en-US" smtClean="0"/>
+              <a:rPr lang="en-US"/>
               <a:t>Fifth level</a:t>
             </a:r>
             <a:endParaRPr kumimoji="0" lang="en-US"/>
@@ -642,7 +640,7 @@
           <a:p>
             <a:fld id="{0D5F8F7A-EA9B-45B0-BFD1-6C644FFD855C}" type="datetimeFigureOut">
               <a:rPr lang="en-PH" smtClean="0"/>
-              <a:t>19/11/2020</a:t>
+              <a:t>01/12/2020</a:t>
             </a:fld>
             <a:endParaRPr lang="en-PH"/>
           </a:p>
@@ -695,13 +693,6 @@
   <p:clrMapOvr>
     <a:masterClrMapping/>
   </p:clrMapOvr>
-  <p:timing>
-    <p:tnLst>
-      <p:par>
-        <p:cTn id="1" dur="indefinite" restart="never" nodeType="tmRoot"/>
-      </p:par>
-    </p:tnLst>
-  </p:timing>
 </p:sldLayout>
 </file>
 
@@ -738,10 +729,9 @@
           <a:lstStyle/>
           <a:p>
             <a:r>
-              <a:rPr kumimoji="0" lang="en-US" smtClean="0"/>
+              <a:rPr kumimoji="0" lang="en-US"/>
               <a:t>Click to edit Master title style</a:t>
             </a:r>
-            <a:endParaRPr kumimoji="0" lang="en-US"/>
           </a:p>
         </p:txBody>
       </p:sp>
@@ -762,35 +752,35 @@
           <a:p>
             <a:pPr lvl="0" eaLnBrk="1" latinLnBrk="0" hangingPunct="1"/>
             <a:r>
-              <a:rPr lang="en-US" smtClean="0"/>
+              <a:rPr lang="en-US"/>
               <a:t>Click to edit Master text styles</a:t>
             </a:r>
           </a:p>
           <a:p>
             <a:pPr lvl="1" eaLnBrk="1" latinLnBrk="0" hangingPunct="1"/>
             <a:r>
-              <a:rPr lang="en-US" smtClean="0"/>
+              <a:rPr lang="en-US"/>
               <a:t>Second level</a:t>
             </a:r>
           </a:p>
           <a:p>
             <a:pPr lvl="2" eaLnBrk="1" latinLnBrk="0" hangingPunct="1"/>
             <a:r>
-              <a:rPr lang="en-US" smtClean="0"/>
+              <a:rPr lang="en-US"/>
               <a:t>Third level</a:t>
             </a:r>
           </a:p>
           <a:p>
             <a:pPr lvl="3" eaLnBrk="1" latinLnBrk="0" hangingPunct="1"/>
             <a:r>
-              <a:rPr lang="en-US" smtClean="0"/>
+              <a:rPr lang="en-US"/>
               <a:t>Fourth level</a:t>
             </a:r>
           </a:p>
           <a:p>
             <a:pPr lvl="4" eaLnBrk="1" latinLnBrk="0" hangingPunct="1"/>
             <a:r>
-              <a:rPr lang="en-US" smtClean="0"/>
+              <a:rPr lang="en-US"/>
               <a:t>Fifth level</a:t>
             </a:r>
             <a:endParaRPr kumimoji="0" lang="en-US"/>
@@ -814,7 +804,7 @@
           <a:p>
             <a:fld id="{0D5F8F7A-EA9B-45B0-BFD1-6C644FFD855C}" type="datetimeFigureOut">
               <a:rPr lang="en-PH" smtClean="0"/>
-              <a:t>19/11/2020</a:t>
+              <a:t>01/12/2020</a:t>
             </a:fld>
             <a:endParaRPr lang="en-PH"/>
           </a:p>
@@ -867,13 +857,6 @@
   <p:clrMapOvr>
     <a:masterClrMapping/>
   </p:clrMapOvr>
-  <p:timing>
-    <p:tnLst>
-      <p:par>
-        <p:cTn id="1" dur="indefinite" restart="never" nodeType="tmRoot"/>
-      </p:par>
-    </p:tnLst>
-  </p:timing>
 </p:sldLayout>
 </file>
 
@@ -964,10 +947,9 @@
           </a:lstStyle>
           <a:p>
             <a:r>
-              <a:rPr kumimoji="0" lang="en-US" smtClean="0"/>
+              <a:rPr kumimoji="0" lang="en-US"/>
               <a:t>Click to edit Master title style</a:t>
             </a:r>
-            <a:endParaRPr kumimoji="0" lang="en-US"/>
           </a:p>
         </p:txBody>
       </p:sp>
@@ -1042,7 +1024,7 @@
           <a:p>
             <a:pPr lvl="0" eaLnBrk="1" latinLnBrk="0" hangingPunct="1"/>
             <a:r>
-              <a:rPr kumimoji="0" lang="en-US" smtClean="0"/>
+              <a:rPr kumimoji="0" lang="en-US"/>
               <a:t>Click to edit Master text styles</a:t>
             </a:r>
           </a:p>
@@ -1065,7 +1047,7 @@
           <a:p>
             <a:fld id="{0D5F8F7A-EA9B-45B0-BFD1-6C644FFD855C}" type="datetimeFigureOut">
               <a:rPr lang="en-PH" smtClean="0"/>
-              <a:t>19/11/2020</a:t>
+              <a:t>01/12/2020</a:t>
             </a:fld>
             <a:endParaRPr lang="en-PH"/>
           </a:p>
@@ -1123,13 +1105,6 @@
   <p:clrMapOvr>
     <a:overrideClrMapping bg1="dk1" tx1="lt1" bg2="dk2" tx2="lt2" accent1="accent1" accent2="accent2" accent3="accent3" accent4="accent4" accent5="accent5" accent6="accent6" hlink="hlink" folHlink="folHlink"/>
   </p:clrMapOvr>
-  <p:timing>
-    <p:tnLst>
-      <p:par>
-        <p:cTn id="1" dur="indefinite" restart="never" nodeType="tmRoot"/>
-      </p:par>
-    </p:tnLst>
-  </p:timing>
 </p:sldLayout>
 </file>
 
@@ -1166,10 +1141,9 @@
           <a:lstStyle/>
           <a:p>
             <a:r>
-              <a:rPr kumimoji="0" lang="en-US" smtClean="0"/>
+              <a:rPr kumimoji="0" lang="en-US"/>
               <a:t>Click to edit Master title style</a:t>
             </a:r>
-            <a:endParaRPr kumimoji="0" lang="en-US"/>
           </a:p>
         </p:txBody>
       </p:sp>
@@ -1211,35 +1185,35 @@
           <a:p>
             <a:pPr lvl="0" eaLnBrk="1" latinLnBrk="0" hangingPunct="1"/>
             <a:r>
-              <a:rPr lang="en-US" smtClean="0"/>
+              <a:rPr lang="en-US"/>
               <a:t>Click to edit Master text styles</a:t>
             </a:r>
           </a:p>
           <a:p>
             <a:pPr lvl="1" eaLnBrk="1" latinLnBrk="0" hangingPunct="1"/>
             <a:r>
-              <a:rPr lang="en-US" smtClean="0"/>
+              <a:rPr lang="en-US"/>
               <a:t>Second level</a:t>
             </a:r>
           </a:p>
           <a:p>
             <a:pPr lvl="2" eaLnBrk="1" latinLnBrk="0" hangingPunct="1"/>
             <a:r>
-              <a:rPr lang="en-US" smtClean="0"/>
+              <a:rPr lang="en-US"/>
               <a:t>Third level</a:t>
             </a:r>
           </a:p>
           <a:p>
             <a:pPr lvl="3" eaLnBrk="1" latinLnBrk="0" hangingPunct="1"/>
             <a:r>
-              <a:rPr lang="en-US" smtClean="0"/>
+              <a:rPr lang="en-US"/>
               <a:t>Fourth level</a:t>
             </a:r>
           </a:p>
           <a:p>
             <a:pPr lvl="4" eaLnBrk="1" latinLnBrk="0" hangingPunct="1"/>
             <a:r>
-              <a:rPr lang="en-US" smtClean="0"/>
+              <a:rPr lang="en-US"/>
               <a:t>Fifth level</a:t>
             </a:r>
             <a:endParaRPr kumimoji="0" lang="en-US"/>
@@ -1284,35 +1258,35 @@
           <a:p>
             <a:pPr lvl="0" eaLnBrk="1" latinLnBrk="0" hangingPunct="1"/>
             <a:r>
-              <a:rPr lang="en-US" smtClean="0"/>
+              <a:rPr lang="en-US"/>
               <a:t>Click to edit Master text styles</a:t>
             </a:r>
           </a:p>
           <a:p>
             <a:pPr lvl="1" eaLnBrk="1" latinLnBrk="0" hangingPunct="1"/>
             <a:r>
-              <a:rPr lang="en-US" smtClean="0"/>
+              <a:rPr lang="en-US"/>
               <a:t>Second level</a:t>
             </a:r>
           </a:p>
           <a:p>
             <a:pPr lvl="2" eaLnBrk="1" latinLnBrk="0" hangingPunct="1"/>
             <a:r>
-              <a:rPr lang="en-US" smtClean="0"/>
+              <a:rPr lang="en-US"/>
               <a:t>Third level</a:t>
             </a:r>
           </a:p>
           <a:p>
             <a:pPr lvl="3" eaLnBrk="1" latinLnBrk="0" hangingPunct="1"/>
             <a:r>
-              <a:rPr lang="en-US" smtClean="0"/>
+              <a:rPr lang="en-US"/>
               <a:t>Fourth level</a:t>
             </a:r>
           </a:p>
           <a:p>
             <a:pPr lvl="4" eaLnBrk="1" latinLnBrk="0" hangingPunct="1"/>
             <a:r>
-              <a:rPr lang="en-US" smtClean="0"/>
+              <a:rPr lang="en-US"/>
               <a:t>Fifth level</a:t>
             </a:r>
             <a:endParaRPr kumimoji="0" lang="en-US"/>
@@ -1336,7 +1310,7 @@
           <a:p>
             <a:fld id="{0D5F8F7A-EA9B-45B0-BFD1-6C644FFD855C}" type="datetimeFigureOut">
               <a:rPr lang="en-PH" smtClean="0"/>
-              <a:t>19/11/2020</a:t>
+              <a:t>01/12/2020</a:t>
             </a:fld>
             <a:endParaRPr lang="en-PH"/>
           </a:p>
@@ -1389,13 +1363,6 @@
   <p:clrMapOvr>
     <a:masterClrMapping/>
   </p:clrMapOvr>
-  <p:timing>
-    <p:tnLst>
-      <p:par>
-        <p:cTn id="1" dur="indefinite" restart="never" nodeType="tmRoot"/>
-      </p:par>
-    </p:tnLst>
-  </p:timing>
 </p:sldLayout>
 </file>
 
@@ -1441,10 +1408,9 @@
           </a:lstStyle>
           <a:p>
             <a:r>
-              <a:rPr kumimoji="0" lang="en-US" smtClean="0"/>
+              <a:rPr kumimoji="0" lang="en-US"/>
               <a:t>Click to edit Master title style</a:t>
             </a:r>
-            <a:endParaRPr kumimoji="0" lang="en-US"/>
           </a:p>
         </p:txBody>
       </p:sp>
@@ -1495,7 +1461,7 @@
           <a:p>
             <a:pPr lvl="0" eaLnBrk="1" latinLnBrk="0" hangingPunct="1"/>
             <a:r>
-              <a:rPr kumimoji="0" lang="en-US" smtClean="0"/>
+              <a:rPr kumimoji="0" lang="en-US"/>
               <a:t>Click to edit Master text styles</a:t>
             </a:r>
           </a:p>
@@ -1548,7 +1514,7 @@
           <a:p>
             <a:pPr lvl="0" eaLnBrk="1" latinLnBrk="0" hangingPunct="1"/>
             <a:r>
-              <a:rPr kumimoji="0" lang="en-US" smtClean="0"/>
+              <a:rPr kumimoji="0" lang="en-US"/>
               <a:t>Click to edit Master text styles</a:t>
             </a:r>
           </a:p>
@@ -1592,35 +1558,35 @@
           <a:p>
             <a:pPr lvl="0" eaLnBrk="1" latinLnBrk="0" hangingPunct="1"/>
             <a:r>
-              <a:rPr lang="en-US" smtClean="0"/>
+              <a:rPr lang="en-US"/>
               <a:t>Click to edit Master text styles</a:t>
             </a:r>
           </a:p>
           <a:p>
             <a:pPr lvl="1" eaLnBrk="1" latinLnBrk="0" hangingPunct="1"/>
             <a:r>
-              <a:rPr lang="en-US" smtClean="0"/>
+              <a:rPr lang="en-US"/>
               <a:t>Second level</a:t>
             </a:r>
           </a:p>
           <a:p>
             <a:pPr lvl="2" eaLnBrk="1" latinLnBrk="0" hangingPunct="1"/>
             <a:r>
-              <a:rPr lang="en-US" smtClean="0"/>
+              <a:rPr lang="en-US"/>
               <a:t>Third level</a:t>
             </a:r>
           </a:p>
           <a:p>
             <a:pPr lvl="3" eaLnBrk="1" latinLnBrk="0" hangingPunct="1"/>
             <a:r>
-              <a:rPr lang="en-US" smtClean="0"/>
+              <a:rPr lang="en-US"/>
               <a:t>Fourth level</a:t>
             </a:r>
           </a:p>
           <a:p>
             <a:pPr lvl="4" eaLnBrk="1" latinLnBrk="0" hangingPunct="1"/>
             <a:r>
-              <a:rPr lang="en-US" smtClean="0"/>
+              <a:rPr lang="en-US"/>
               <a:t>Fifth level</a:t>
             </a:r>
             <a:endParaRPr kumimoji="0" lang="en-US"/>
@@ -1665,35 +1631,35 @@
           <a:p>
             <a:pPr lvl="0" eaLnBrk="1" latinLnBrk="0" hangingPunct="1"/>
             <a:r>
-              <a:rPr lang="en-US" smtClean="0"/>
+              <a:rPr lang="en-US"/>
               <a:t>Click to edit Master text styles</a:t>
             </a:r>
           </a:p>
           <a:p>
             <a:pPr lvl="1" eaLnBrk="1" latinLnBrk="0" hangingPunct="1"/>
             <a:r>
-              <a:rPr lang="en-US" smtClean="0"/>
+              <a:rPr lang="en-US"/>
               <a:t>Second level</a:t>
             </a:r>
           </a:p>
           <a:p>
             <a:pPr lvl="2" eaLnBrk="1" latinLnBrk="0" hangingPunct="1"/>
             <a:r>
-              <a:rPr lang="en-US" smtClean="0"/>
+              <a:rPr lang="en-US"/>
               <a:t>Third level</a:t>
             </a:r>
           </a:p>
           <a:p>
             <a:pPr lvl="3" eaLnBrk="1" latinLnBrk="0" hangingPunct="1"/>
             <a:r>
-              <a:rPr lang="en-US" smtClean="0"/>
+              <a:rPr lang="en-US"/>
               <a:t>Fourth level</a:t>
             </a:r>
           </a:p>
           <a:p>
             <a:pPr lvl="4" eaLnBrk="1" latinLnBrk="0" hangingPunct="1"/>
             <a:r>
-              <a:rPr lang="en-US" smtClean="0"/>
+              <a:rPr lang="en-US"/>
               <a:t>Fifth level</a:t>
             </a:r>
             <a:endParaRPr kumimoji="0" lang="en-US"/>
@@ -1717,7 +1683,7 @@
           <a:p>
             <a:fld id="{0D5F8F7A-EA9B-45B0-BFD1-6C644FFD855C}" type="datetimeFigureOut">
               <a:rPr lang="en-PH" smtClean="0"/>
-              <a:t>19/11/2020</a:t>
+              <a:t>01/12/2020</a:t>
             </a:fld>
             <a:endParaRPr lang="en-PH"/>
           </a:p>
@@ -1770,13 +1736,6 @@
   <p:clrMapOvr>
     <a:masterClrMapping/>
   </p:clrMapOvr>
-  <p:timing>
-    <p:tnLst>
-      <p:par>
-        <p:cTn id="1" dur="indefinite" restart="never" nodeType="tmRoot"/>
-      </p:par>
-    </p:tnLst>
-  </p:timing>
 </p:sldLayout>
 </file>
 
@@ -1813,10 +1772,9 @@
           <a:lstStyle/>
           <a:p>
             <a:r>
-              <a:rPr kumimoji="0" lang="en-US" smtClean="0"/>
+              <a:rPr kumimoji="0" lang="en-US"/>
               <a:t>Click to edit Master title style</a:t>
             </a:r>
-            <a:endParaRPr kumimoji="0" lang="en-US"/>
           </a:p>
         </p:txBody>
       </p:sp>
@@ -1837,7 +1795,7 @@
           <a:p>
             <a:fld id="{0D5F8F7A-EA9B-45B0-BFD1-6C644FFD855C}" type="datetimeFigureOut">
               <a:rPr lang="en-PH" smtClean="0"/>
-              <a:t>19/11/2020</a:t>
+              <a:t>01/12/2020</a:t>
             </a:fld>
             <a:endParaRPr lang="en-PH"/>
           </a:p>
@@ -1890,13 +1848,6 @@
   <p:clrMapOvr>
     <a:masterClrMapping/>
   </p:clrMapOvr>
-  <p:timing>
-    <p:tnLst>
-      <p:par>
-        <p:cTn id="1" dur="indefinite" restart="never" nodeType="tmRoot"/>
-      </p:par>
-    </p:tnLst>
-  </p:timing>
 </p:sldLayout>
 </file>
 
@@ -1934,7 +1885,7 @@
           <a:p>
             <a:fld id="{0D5F8F7A-EA9B-45B0-BFD1-6C644FFD855C}" type="datetimeFigureOut">
               <a:rPr lang="en-PH" smtClean="0"/>
-              <a:t>19/11/2020</a:t>
+              <a:t>01/12/2020</a:t>
             </a:fld>
             <a:endParaRPr lang="en-PH"/>
           </a:p>
@@ -1987,13 +1938,6 @@
   <p:clrMapOvr>
     <a:masterClrMapping/>
   </p:clrMapOvr>
-  <p:timing>
-    <p:tnLst>
-      <p:par>
-        <p:cTn id="1" dur="indefinite" restart="never" nodeType="tmRoot"/>
-      </p:par>
-    </p:tnLst>
-  </p:timing>
 </p:sldLayout>
 </file>
 
@@ -2053,10 +1997,9 @@
           </a:lstStyle>
           <a:p>
             <a:r>
-              <a:rPr kumimoji="0" lang="en-US" smtClean="0"/>
+              <a:rPr kumimoji="0" lang="en-US"/>
               <a:t>Click to edit Master title style</a:t>
             </a:r>
-            <a:endParaRPr kumimoji="0" lang="en-US"/>
           </a:p>
         </p:txBody>
       </p:sp>
@@ -2103,7 +2046,7 @@
           <a:p>
             <a:pPr lvl="0" eaLnBrk="1" latinLnBrk="0" hangingPunct="1"/>
             <a:r>
-              <a:rPr kumimoji="0" lang="en-US" smtClean="0"/>
+              <a:rPr kumimoji="0" lang="en-US"/>
               <a:t>Click to edit Master text styles</a:t>
             </a:r>
           </a:p>
@@ -2147,35 +2090,35 @@
           <a:p>
             <a:pPr lvl="0" eaLnBrk="1" latinLnBrk="0" hangingPunct="1"/>
             <a:r>
-              <a:rPr lang="en-US" smtClean="0"/>
+              <a:rPr lang="en-US"/>
               <a:t>Click to edit Master text styles</a:t>
             </a:r>
           </a:p>
           <a:p>
             <a:pPr lvl="1" eaLnBrk="1" latinLnBrk="0" hangingPunct="1"/>
             <a:r>
-              <a:rPr lang="en-US" smtClean="0"/>
+              <a:rPr lang="en-US"/>
               <a:t>Second level</a:t>
             </a:r>
           </a:p>
           <a:p>
             <a:pPr lvl="2" eaLnBrk="1" latinLnBrk="0" hangingPunct="1"/>
             <a:r>
-              <a:rPr lang="en-US" smtClean="0"/>
+              <a:rPr lang="en-US"/>
               <a:t>Third level</a:t>
             </a:r>
           </a:p>
           <a:p>
             <a:pPr lvl="3" eaLnBrk="1" latinLnBrk="0" hangingPunct="1"/>
             <a:r>
-              <a:rPr lang="en-US" smtClean="0"/>
+              <a:rPr lang="en-US"/>
               <a:t>Fourth level</a:t>
             </a:r>
           </a:p>
           <a:p>
             <a:pPr lvl="4" eaLnBrk="1" latinLnBrk="0" hangingPunct="1"/>
             <a:r>
-              <a:rPr lang="en-US" smtClean="0"/>
+              <a:rPr lang="en-US"/>
               <a:t>Fifth level</a:t>
             </a:r>
             <a:endParaRPr kumimoji="0" lang="en-US"/>
@@ -2199,7 +2142,7 @@
           <a:p>
             <a:fld id="{0D5F8F7A-EA9B-45B0-BFD1-6C644FFD855C}" type="datetimeFigureOut">
               <a:rPr lang="en-PH" smtClean="0"/>
-              <a:t>19/11/2020</a:t>
+              <a:t>01/12/2020</a:t>
             </a:fld>
             <a:endParaRPr lang="en-PH"/>
           </a:p>
@@ -2252,13 +2195,6 @@
   <p:clrMapOvr>
     <a:masterClrMapping/>
   </p:clrMapOvr>
-  <p:timing>
-    <p:tnLst>
-      <p:par>
-        <p:cTn id="1" dur="indefinite" restart="never" nodeType="tmRoot"/>
-      </p:par>
-    </p:tnLst>
-  </p:timing>
 </p:sldLayout>
 </file>
 
@@ -2307,10 +2243,9 @@
           </a:lstStyle>
           <a:p>
             <a:r>
-              <a:rPr kumimoji="0" lang="en-US" smtClean="0"/>
+              <a:rPr kumimoji="0" lang="en-US"/>
               <a:t>Click to edit Master title style</a:t>
             </a:r>
-            <a:endParaRPr kumimoji="0" lang="en-US"/>
           </a:p>
         </p:txBody>
       </p:sp>
@@ -2387,7 +2322,7 @@
           <a:p>
             <a:pPr marL="0" algn="l" rtl="0" eaLnBrk="1" latinLnBrk="0" hangingPunct="1"/>
             <a:r>
-              <a:rPr kumimoji="0" lang="en-US" smtClean="0">
+              <a:rPr kumimoji="0" lang="en-US">
                 <a:solidFill>
                   <a:schemeClr val="lt1"/>
                 </a:solidFill>
@@ -2447,7 +2382,7 @@
           <a:p>
             <a:pPr lvl="0" eaLnBrk="1" latinLnBrk="0" hangingPunct="1"/>
             <a:r>
-              <a:rPr kumimoji="0" lang="en-US" smtClean="0"/>
+              <a:rPr kumimoji="0" lang="en-US"/>
               <a:t>Click to edit Master text styles</a:t>
             </a:r>
           </a:p>
@@ -2470,7 +2405,7 @@
           <a:p>
             <a:fld id="{0D5F8F7A-EA9B-45B0-BFD1-6C644FFD855C}" type="datetimeFigureOut">
               <a:rPr lang="en-PH" smtClean="0"/>
-              <a:t>19/11/2020</a:t>
+              <a:t>01/12/2020</a:t>
             </a:fld>
             <a:endParaRPr lang="en-PH"/>
           </a:p>
@@ -2523,13 +2458,6 @@
   <p:clrMapOvr>
     <a:masterClrMapping/>
   </p:clrMapOvr>
-  <p:timing>
-    <p:tnLst>
-      <p:par>
-        <p:cTn id="1" dur="indefinite" restart="never" nodeType="tmRoot"/>
-      </p:par>
-    </p:tnLst>
-  </p:timing>
 </p:sldLayout>
 </file>
 
@@ -2590,10 +2518,9 @@
           <a:lstStyle/>
           <a:p>
             <a:r>
-              <a:rPr kumimoji="0" lang="en-US" smtClean="0"/>
+              <a:rPr kumimoji="0" lang="en-US"/>
               <a:t>Click to edit Master title style</a:t>
             </a:r>
-            <a:endParaRPr kumimoji="0" lang="en-US"/>
           </a:p>
         </p:txBody>
       </p:sp>
@@ -2624,38 +2551,37 @@
           <a:p>
             <a:pPr lvl="0" eaLnBrk="1" latinLnBrk="0" hangingPunct="1"/>
             <a:r>
-              <a:rPr kumimoji="0" lang="en-US" smtClean="0"/>
+              <a:rPr kumimoji="0" lang="en-US"/>
               <a:t>Click to edit Master text styles</a:t>
             </a:r>
           </a:p>
           <a:p>
             <a:pPr lvl="1" eaLnBrk="1" latinLnBrk="0" hangingPunct="1"/>
             <a:r>
-              <a:rPr kumimoji="0" lang="en-US" smtClean="0"/>
+              <a:rPr kumimoji="0" lang="en-US"/>
               <a:t>Second level</a:t>
             </a:r>
           </a:p>
           <a:p>
             <a:pPr lvl="2" eaLnBrk="1" latinLnBrk="0" hangingPunct="1"/>
             <a:r>
-              <a:rPr kumimoji="0" lang="en-US" smtClean="0"/>
+              <a:rPr kumimoji="0" lang="en-US"/>
               <a:t>Third level</a:t>
             </a:r>
           </a:p>
           <a:p>
             <a:pPr lvl="3" eaLnBrk="1" latinLnBrk="0" hangingPunct="1"/>
             <a:r>
-              <a:rPr kumimoji="0" lang="en-US" smtClean="0"/>
+              <a:rPr kumimoji="0" lang="en-US"/>
               <a:t>Fourth level</a:t>
             </a:r>
           </a:p>
           <a:p>
             <a:pPr lvl="4" eaLnBrk="1" latinLnBrk="0" hangingPunct="1"/>
             <a:r>
-              <a:rPr kumimoji="0" lang="en-US" smtClean="0"/>
+              <a:rPr kumimoji="0" lang="en-US"/>
               <a:t>Fifth level</a:t>
             </a:r>
-            <a:endParaRPr kumimoji="0" lang="en-US"/>
           </a:p>
         </p:txBody>
       </p:sp>
@@ -2694,7 +2620,7 @@
           <a:p>
             <a:fld id="{0D5F8F7A-EA9B-45B0-BFD1-6C644FFD855C}" type="datetimeFigureOut">
               <a:rPr lang="en-PH" smtClean="0"/>
-              <a:t>19/11/2020</a:t>
+              <a:t>01/12/2020</a:t>
             </a:fld>
             <a:endParaRPr lang="en-PH"/>
           </a:p>
@@ -2794,13 +2720,6 @@
     <p:sldLayoutId id="2147483874" r:id="rId10"/>
     <p:sldLayoutId id="2147483875" r:id="rId11"/>
   </p:sldLayoutIdLst>
-  <p:timing>
-    <p:tnLst>
-      <p:par>
-        <p:cTn id="1" dur="indefinite" restart="never" nodeType="tmRoot"/>
-      </p:par>
-    </p:tnLst>
-  </p:timing>
   <p:txStyles>
     <p:titleStyle>
       <a:lvl1pPr algn="ctr" rtl="0" eaLnBrk="1" latinLnBrk="0" hangingPunct="1">
@@ -3141,13 +3060,18 @@
             <p:ph type="ctrTitle"/>
           </p:nvPr>
         </p:nvSpPr>
-        <p:spPr/>
-        <p:txBody>
-          <a:bodyPr/>
-          <a:lstStyle/>
-          <a:p>
-            <a:r>
-              <a:rPr lang="en-US" dirty="0" smtClean="0"/>
+        <p:spPr>
+          <a:xfrm>
+            <a:off x="457200" y="457200"/>
+            <a:ext cx="8229600" cy="1828800"/>
+          </a:xfrm>
+        </p:spPr>
+        <p:txBody>
+          <a:bodyPr/>
+          <a:lstStyle/>
+          <a:p>
+            <a:r>
+              <a:rPr lang="en-US" dirty="0"/>
               <a:t>Stephen Alex Ngo</a:t>
             </a:r>
             <a:endParaRPr lang="en-PH" dirty="0"/>
@@ -3164,25 +3088,68 @@
             <p:ph type="subTitle" idx="1"/>
           </p:nvPr>
         </p:nvSpPr>
-        <p:spPr/>
-        <p:txBody>
-          <a:bodyPr/>
-          <a:lstStyle/>
-          <a:p>
-            <a:r>
-              <a:rPr lang="en-US" dirty="0" smtClean="0"/>
+        <p:spPr>
+          <a:xfrm>
+            <a:off x="1371600" y="2286000"/>
+            <a:ext cx="6400800" cy="1752600"/>
+          </a:xfrm>
+        </p:spPr>
+        <p:txBody>
+          <a:bodyPr/>
+          <a:lstStyle/>
+          <a:p>
+            <a:r>
+              <a:rPr lang="en-US" dirty="0"/>
               <a:t>Section - S11</a:t>
             </a:r>
           </a:p>
           <a:p>
             <a:r>
-              <a:rPr lang="en-US" dirty="0" smtClean="0"/>
-              <a:t>Video - </a:t>
+              <a:rPr lang="en-US" dirty="0"/>
+              <a:t>Video:</a:t>
             </a:r>
             <a:endParaRPr lang="en-PH" dirty="0"/>
           </a:p>
         </p:txBody>
       </p:sp>
+      <p:pic>
+        <p:nvPicPr>
+          <p:cNvPr id="4" name="CMPILER Scanner Probset">
+            <a:hlinkClick r:id="" action="ppaction://media"/>
+            <a:extLst>
+              <a:ext uri="{FF2B5EF4-FFF2-40B4-BE49-F238E27FC236}">
+                <a16:creationId xmlns:a16="http://schemas.microsoft.com/office/drawing/2014/main" id="{A8A428A8-7173-4803-BB25-716F13E5A0EE}"/>
+              </a:ext>
+            </a:extLst>
+          </p:cNvPr>
+          <p:cNvPicPr>
+            <a:picLocks noChangeAspect="1"/>
+          </p:cNvPicPr>
+          <p:nvPr>
+            <a:videoFile r:link="rId2"/>
+            <p:extLst>
+              <p:ext uri="{DAA4B4D4-6D71-4841-9C94-3DE7FCFB9230}">
+                <p14:media xmlns:p14="http://schemas.microsoft.com/office/powerpoint/2010/main" r:embed="rId1"/>
+              </p:ext>
+            </p:extLst>
+          </p:nvPr>
+        </p:nvPicPr>
+        <p:blipFill>
+          <a:blip r:embed="rId4"/>
+          <a:stretch>
+            <a:fillRect/>
+          </a:stretch>
+        </p:blipFill>
+        <p:spPr>
+          <a:xfrm>
+            <a:off x="1339921" y="3314700"/>
+            <a:ext cx="7035800" cy="3429000"/>
+          </a:xfrm>
+          <a:prstGeom prst="rect">
+            <a:avLst/>
+          </a:prstGeom>
+        </p:spPr>
+      </p:pic>
     </p:spTree>
     <p:extLst>
       <p:ext uri="{BB962C8B-B14F-4D97-AF65-F5344CB8AC3E}">
@@ -3193,6 +3160,141 @@
   <p:clrMapOvr>
     <a:masterClrMapping/>
   </p:clrMapOvr>
+  <p:timing>
+    <p:tnLst>
+      <p:par>
+        <p:cTn id="1" dur="indefinite" restart="never" nodeType="tmRoot">
+          <p:childTnLst>
+            <p:seq concurrent="1" nextAc="seek">
+              <p:cTn id="2" dur="indefinite" nodeType="mainSeq">
+                <p:childTnLst>
+                  <p:par>
+                    <p:cTn id="3" fill="hold">
+                      <p:stCondLst>
+                        <p:cond delay="indefinite"/>
+                      </p:stCondLst>
+                      <p:childTnLst>
+                        <p:par>
+                          <p:cTn id="4" fill="hold">
+                            <p:stCondLst>
+                              <p:cond delay="0"/>
+                            </p:stCondLst>
+                            <p:childTnLst>
+                              <p:par>
+                                <p:cTn id="5" presetID="1" presetClass="mediacall" presetSubtype="0" fill="hold" nodeType="clickEffect">
+                                  <p:stCondLst>
+                                    <p:cond delay="0"/>
+                                  </p:stCondLst>
+                                  <p:childTnLst>
+                                    <p:cmd type="call" cmd="playFrom(0.0)">
+                                      <p:cBhvr>
+                                        <p:cTn id="6" dur="63456" fill="hold"/>
+                                        <p:tgtEl>
+                                          <p:spTgt spid="4"/>
+                                        </p:tgtEl>
+                                      </p:cBhvr>
+                                    </p:cmd>
+                                  </p:childTnLst>
+                                </p:cTn>
+                              </p:par>
+                            </p:childTnLst>
+                          </p:cTn>
+                        </p:par>
+                      </p:childTnLst>
+                    </p:cTn>
+                  </p:par>
+                </p:childTnLst>
+              </p:cTn>
+              <p:prevCondLst>
+                <p:cond evt="onPrev" delay="0">
+                  <p:tgtEl>
+                    <p:sldTgt/>
+                  </p:tgtEl>
+                </p:cond>
+              </p:prevCondLst>
+              <p:nextCondLst>
+                <p:cond evt="onNext" delay="0">
+                  <p:tgtEl>
+                    <p:sldTgt/>
+                  </p:tgtEl>
+                </p:cond>
+              </p:nextCondLst>
+            </p:seq>
+            <p:video>
+              <p:cMediaNode vol="80000">
+                <p:cTn id="7" fill="hold" display="0">
+                  <p:stCondLst>
+                    <p:cond delay="indefinite"/>
+                  </p:stCondLst>
+                </p:cTn>
+                <p:tgtEl>
+                  <p:spTgt spid="4"/>
+                </p:tgtEl>
+              </p:cMediaNode>
+            </p:video>
+            <p:seq concurrent="1" nextAc="seek">
+              <p:cTn id="8" restart="whenNotActive" fill="hold" evtFilter="cancelBubble" nodeType="interactiveSeq">
+                <p:stCondLst>
+                  <p:cond evt="onClick" delay="0">
+                    <p:tgtEl>
+                      <p:spTgt spid="4"/>
+                    </p:tgtEl>
+                  </p:cond>
+                </p:stCondLst>
+                <p:endSync evt="end" delay="0">
+                  <p:rtn val="all"/>
+                </p:endSync>
+                <p:childTnLst>
+                  <p:par>
+                    <p:cTn id="9" fill="hold">
+                      <p:stCondLst>
+                        <p:cond delay="0"/>
+                      </p:stCondLst>
+                      <p:childTnLst>
+                        <p:par>
+                          <p:cTn id="10" fill="hold">
+                            <p:stCondLst>
+                              <p:cond delay="0"/>
+                            </p:stCondLst>
+                            <p:childTnLst>
+                              <p:par>
+                                <p:cTn id="11" presetID="2" presetClass="mediacall" presetSubtype="0" fill="hold" nodeType="clickEffect">
+                                  <p:stCondLst>
+                                    <p:cond delay="0"/>
+                                  </p:stCondLst>
+                                  <p:childTnLst>
+                                    <p:cmd type="call" cmd="togglePause">
+                                      <p:cBhvr>
+                                        <p:cTn id="12" dur="1" fill="hold"/>
+                                        <p:tgtEl>
+                                          <p:spTgt spid="4"/>
+                                        </p:tgtEl>
+                                      </p:cBhvr>
+                                    </p:cmd>
+                                  </p:childTnLst>
+                                </p:cTn>
+                              </p:par>
+                            </p:childTnLst>
+                          </p:cTn>
+                        </p:par>
+                      </p:childTnLst>
+                    </p:cTn>
+                  </p:par>
+                </p:childTnLst>
+              </p:cTn>
+              <p:nextCondLst>
+                <p:cond evt="onClick" delay="0">
+                  <p:tgtEl>
+                    <p:spTgt spid="4"/>
+                  </p:tgtEl>
+                </p:cond>
+              </p:nextCondLst>
+            </p:seq>
+          </p:childTnLst>
+        </p:cTn>
+      </p:par>
+    </p:tnLst>
+  </p:timing>
 </p:sld>
 </file>
 
@@ -3229,7 +3331,7 @@
           <a:lstStyle/>
           <a:p>
             <a:r>
-              <a:rPr lang="en-US" dirty="0" smtClean="0"/>
+              <a:rPr lang="en-US" dirty="0"/>
               <a:t>Thank you!! :D</a:t>
             </a:r>
             <a:endParaRPr lang="en-PH" dirty="0"/>
@@ -3301,7 +3403,7 @@
           <a:lstStyle/>
           <a:p>
             <a:r>
-              <a:rPr lang="en-US" dirty="0" smtClean="0"/>
+              <a:rPr lang="en-US" dirty="0"/>
               <a:t>Lexical Analysis</a:t>
             </a:r>
             <a:endParaRPr lang="en-PH" dirty="0"/>
@@ -3329,16 +3431,8 @@
           <a:lstStyle/>
           <a:p>
             <a:r>
-              <a:rPr lang="en-US" dirty="0" smtClean="0"/>
-              <a:t>First, I read the file which contains the sample input test cases given. Put all the texts in a buffered reader. </a:t>
-            </a:r>
-            <a:r>
               <a:rPr lang="en-US" dirty="0"/>
-              <a:t>A</a:t>
-            </a:r>
-            <a:r>
-              <a:rPr lang="en-US" dirty="0" smtClean="0"/>
-              <a:t>fter that,</a:t>
+              <a:t>First, I read the file which contains the sample input test cases given. Put all the texts in a buffered reader. After that,</a:t>
             </a:r>
             <a:endParaRPr lang="en-PH" dirty="0"/>
           </a:p>
@@ -3485,7 +3579,7 @@
           <a:lstStyle/>
           <a:p>
             <a:r>
-              <a:rPr lang="en-US" dirty="0" smtClean="0"/>
+              <a:rPr lang="en-US" dirty="0"/>
               <a:t>I loop it line per line until EOF(end of file) then per line I replace all the commas (delimiter) into empty string, then split all by whitespace so I can get all single words independently which will be my tokens.</a:t>
             </a:r>
             <a:endParaRPr lang="en-PH" dirty="0"/>
@@ -3602,7 +3696,7 @@
           <a:lstStyle/>
           <a:p>
             <a:r>
-              <a:rPr lang="en-US" dirty="0" smtClean="0"/>
+              <a:rPr lang="en-US" dirty="0"/>
               <a:t>Additionally – Token Class</a:t>
             </a:r>
             <a:endParaRPr lang="en-PH" dirty="0"/>
@@ -3630,7 +3724,7 @@
           <a:lstStyle/>
           <a:p>
             <a:r>
-              <a:rPr lang="en-US" dirty="0" smtClean="0"/>
+              <a:rPr lang="en-US" dirty="0"/>
               <a:t>This is my Token class wherein creating my token will automatically identify its type.</a:t>
             </a:r>
             <a:endParaRPr lang="en-PH" dirty="0"/>
@@ -3749,7 +3843,7 @@
           <a:lstStyle/>
           <a:p>
             <a:r>
-              <a:rPr lang="en-US" dirty="0" smtClean="0"/>
+              <a:rPr lang="en-US" dirty="0"/>
               <a:t>Maximal Munch Implementation</a:t>
             </a:r>
             <a:endParaRPr lang="en-PH" dirty="0"/>
@@ -3779,7 +3873,7 @@
           <a:lstStyle/>
           <a:p>
             <a:r>
-              <a:rPr lang="en-US" dirty="0" smtClean="0"/>
+              <a:rPr lang="en-US" dirty="0"/>
               <a:t>This is where I implement the maximal munch, wherein I check all the characters in the word so if its “DMULTU”, I didn’t stop at DMULT since we have to find the longest possible path even though I reached the final state, I keep checking until it reaches the most final state.</a:t>
             </a:r>
             <a:endParaRPr lang="en-PH" dirty="0"/>
@@ -3896,7 +3990,7 @@
           <a:lstStyle/>
           <a:p>
             <a:r>
-              <a:rPr lang="en-US" dirty="0" smtClean="0"/>
+              <a:rPr lang="en-US" dirty="0"/>
               <a:t>DFA</a:t>
             </a:r>
             <a:endParaRPr lang="en-PH" dirty="0"/>
@@ -3905,7 +3999,7 @@
       </p:sp>
       <p:pic>
         <p:nvPicPr>
-          <p:cNvPr id="5122" name="Picture 2"/>
+          <p:cNvPr id="1026" name="Picture 2"/>
           <p:cNvPicPr>
             <a:picLocks noGrp="1" noChangeAspect="1" noChangeArrowheads="1"/>
           </p:cNvPicPr>
@@ -3928,8 +4022,8 @@
         </p:blipFill>
         <p:spPr bwMode="auto">
           <a:xfrm>
-            <a:off x="457200" y="1295400"/>
-            <a:ext cx="8229600" cy="5257800"/>
+            <a:off x="1447800" y="1295400"/>
+            <a:ext cx="6248399" cy="5324328"/>
           </a:xfrm>
           <a:prstGeom prst="rect">
             <a:avLst/>
@@ -4015,7 +4109,7 @@
           <a:lstStyle/>
           <a:p>
             <a:r>
-              <a:rPr lang="en-US" dirty="0" smtClean="0"/>
+              <a:rPr lang="en-US" dirty="0"/>
               <a:t>Unrecognizable Tokens</a:t>
             </a:r>
             <a:endParaRPr lang="en-PH" dirty="0"/>
@@ -4043,7 +4137,7 @@
           <a:lstStyle/>
           <a:p>
             <a:r>
-              <a:rPr lang="en-US" dirty="0" smtClean="0"/>
+              <a:rPr lang="en-US" dirty="0"/>
               <a:t>If the current state is not the final state wherein the tokenization process is finish.</a:t>
             </a:r>
           </a:p>
@@ -4189,11 +4283,7 @@
           <a:p>
             <a:r>
               <a:rPr lang="en-US" dirty="0"/>
-              <a:t>If the current state reached the  “garb state”, this means there are some invalid characters in the </a:t>
-            </a:r>
-            <a:r>
-              <a:rPr lang="en-US" dirty="0" smtClean="0"/>
-              <a:t>word or not part of any valid transitions.</a:t>
+              <a:t>If the current state reached the  “garb state”, this means there are some invalid characters in the word or not part of any valid transitions.</a:t>
             </a:r>
             <a:endParaRPr lang="en-PH" dirty="0"/>
           </a:p>
@@ -4335,7 +4425,7 @@
           <a:lstStyle/>
           <a:p>
             <a:r>
-              <a:rPr lang="en-US" dirty="0" smtClean="0"/>
+              <a:rPr lang="en-US" dirty="0"/>
               <a:t>Lastly since I observed that all the valid tokens only consists of 2 – 6 characters, anything greater than or less than it will be considered as ERROR.</a:t>
             </a:r>
             <a:endParaRPr lang="en-PH" dirty="0"/>

</xml_diff>

<commit_message>
Final Video and input and outputtext files and powerpoint added new video for the new test case
</commit_message>
<xml_diff>
--- a/powerpoint.pptx
+++ b/powerpoint.pptx
@@ -242,7 +242,7 @@
           <a:p>
             <a:fld id="{0D5F8F7A-EA9B-45B0-BFD1-6C644FFD855C}" type="datetimeFigureOut">
               <a:rPr lang="en-PH" smtClean="0"/>
-              <a:t>01/12/2020</a:t>
+              <a:t>03/12/2020</a:t>
             </a:fld>
             <a:endParaRPr lang="en-PH"/>
           </a:p>
@@ -466,7 +466,7 @@
           <a:p>
             <a:fld id="{0D5F8F7A-EA9B-45B0-BFD1-6C644FFD855C}" type="datetimeFigureOut">
               <a:rPr lang="en-PH" smtClean="0"/>
-              <a:t>01/12/2020</a:t>
+              <a:t>03/12/2020</a:t>
             </a:fld>
             <a:endParaRPr lang="en-PH"/>
           </a:p>
@@ -640,7 +640,7 @@
           <a:p>
             <a:fld id="{0D5F8F7A-EA9B-45B0-BFD1-6C644FFD855C}" type="datetimeFigureOut">
               <a:rPr lang="en-PH" smtClean="0"/>
-              <a:t>01/12/2020</a:t>
+              <a:t>03/12/2020</a:t>
             </a:fld>
             <a:endParaRPr lang="en-PH"/>
           </a:p>
@@ -804,7 +804,7 @@
           <a:p>
             <a:fld id="{0D5F8F7A-EA9B-45B0-BFD1-6C644FFD855C}" type="datetimeFigureOut">
               <a:rPr lang="en-PH" smtClean="0"/>
-              <a:t>01/12/2020</a:t>
+              <a:t>03/12/2020</a:t>
             </a:fld>
             <a:endParaRPr lang="en-PH"/>
           </a:p>
@@ -1047,7 +1047,7 @@
           <a:p>
             <a:fld id="{0D5F8F7A-EA9B-45B0-BFD1-6C644FFD855C}" type="datetimeFigureOut">
               <a:rPr lang="en-PH" smtClean="0"/>
-              <a:t>01/12/2020</a:t>
+              <a:t>03/12/2020</a:t>
             </a:fld>
             <a:endParaRPr lang="en-PH"/>
           </a:p>
@@ -1310,7 +1310,7 @@
           <a:p>
             <a:fld id="{0D5F8F7A-EA9B-45B0-BFD1-6C644FFD855C}" type="datetimeFigureOut">
               <a:rPr lang="en-PH" smtClean="0"/>
-              <a:t>01/12/2020</a:t>
+              <a:t>03/12/2020</a:t>
             </a:fld>
             <a:endParaRPr lang="en-PH"/>
           </a:p>
@@ -1683,7 +1683,7 @@
           <a:p>
             <a:fld id="{0D5F8F7A-EA9B-45B0-BFD1-6C644FFD855C}" type="datetimeFigureOut">
               <a:rPr lang="en-PH" smtClean="0"/>
-              <a:t>01/12/2020</a:t>
+              <a:t>03/12/2020</a:t>
             </a:fld>
             <a:endParaRPr lang="en-PH"/>
           </a:p>
@@ -1795,7 +1795,7 @@
           <a:p>
             <a:fld id="{0D5F8F7A-EA9B-45B0-BFD1-6C644FFD855C}" type="datetimeFigureOut">
               <a:rPr lang="en-PH" smtClean="0"/>
-              <a:t>01/12/2020</a:t>
+              <a:t>03/12/2020</a:t>
             </a:fld>
             <a:endParaRPr lang="en-PH"/>
           </a:p>
@@ -1885,7 +1885,7 @@
           <a:p>
             <a:fld id="{0D5F8F7A-EA9B-45B0-BFD1-6C644FFD855C}" type="datetimeFigureOut">
               <a:rPr lang="en-PH" smtClean="0"/>
-              <a:t>01/12/2020</a:t>
+              <a:t>03/12/2020</a:t>
             </a:fld>
             <a:endParaRPr lang="en-PH"/>
           </a:p>
@@ -2142,7 +2142,7 @@
           <a:p>
             <a:fld id="{0D5F8F7A-EA9B-45B0-BFD1-6C644FFD855C}" type="datetimeFigureOut">
               <a:rPr lang="en-PH" smtClean="0"/>
-              <a:t>01/12/2020</a:t>
+              <a:t>03/12/2020</a:t>
             </a:fld>
             <a:endParaRPr lang="en-PH"/>
           </a:p>
@@ -2405,7 +2405,7 @@
           <a:p>
             <a:fld id="{0D5F8F7A-EA9B-45B0-BFD1-6C644FFD855C}" type="datetimeFigureOut">
               <a:rPr lang="en-PH" smtClean="0"/>
-              <a:t>01/12/2020</a:t>
+              <a:t>03/12/2020</a:t>
             </a:fld>
             <a:endParaRPr lang="en-PH"/>
           </a:p>
@@ -2620,7 +2620,7 @@
           <a:p>
             <a:fld id="{0D5F8F7A-EA9B-45B0-BFD1-6C644FFD855C}" type="datetimeFigureOut">
               <a:rPr lang="en-PH" smtClean="0"/>
-              <a:t>01/12/2020</a:t>
+              <a:t>03/12/2020</a:t>
             </a:fld>
             <a:endParaRPr lang="en-PH"/>
           </a:p>
@@ -3114,11 +3114,11 @@
       </p:sp>
       <p:pic>
         <p:nvPicPr>
-          <p:cNvPr id="4" name="CMPILER Scanner Probset">
+          <p:cNvPr id="5" name="CMIPLER_PS_SCANNER_VIDEO_STEPHEN_NGO">
             <a:hlinkClick r:id="" action="ppaction://media"/>
             <a:extLst>
               <a:ext uri="{FF2B5EF4-FFF2-40B4-BE49-F238E27FC236}">
-                <a16:creationId xmlns:a16="http://schemas.microsoft.com/office/drawing/2014/main" id="{A8A428A8-7173-4803-BB25-716F13E5A0EE}"/>
+                <a16:creationId xmlns:a16="http://schemas.microsoft.com/office/drawing/2014/main" id="{1A1E02EC-5A23-4E48-B054-CCF8E577DB90}"/>
               </a:ext>
             </a:extLst>
           </p:cNvPr>
@@ -3142,8 +3142,8 @@
         </p:blipFill>
         <p:spPr>
           <a:xfrm>
-            <a:off x="1339921" y="3314700"/>
-            <a:ext cx="7035800" cy="3429000"/>
+            <a:off x="1447800" y="3276600"/>
+            <a:ext cx="6654800" cy="3438525"/>
           </a:xfrm>
           <a:prstGeom prst="rect">
             <a:avLst/>
@@ -3188,9 +3188,9 @@
                                   <p:childTnLst>
                                     <p:cmd type="call" cmd="playFrom(0.0)">
                                       <p:cBhvr>
-                                        <p:cTn id="6" dur="63456" fill="hold"/>
+                                        <p:cTn id="6" dur="51442" fill="hold"/>
                                         <p:tgtEl>
-                                          <p:spTgt spid="4"/>
+                                          <p:spTgt spid="5"/>
                                         </p:tgtEl>
                                       </p:cBhvr>
                                     </p:cmd>
@@ -3228,7 +3228,7 @@
                   </p:stCondLst>
                 </p:cTn>
                 <p:tgtEl>
-                  <p:spTgt spid="4"/>
+                  <p:spTgt spid="5"/>
                 </p:tgtEl>
               </p:cMediaNode>
             </p:video>
@@ -3237,7 +3237,7 @@
                 <p:stCondLst>
                   <p:cond evt="onClick" delay="0">
                     <p:tgtEl>
-                      <p:spTgt spid="4"/>
+                      <p:spTgt spid="5"/>
                     </p:tgtEl>
                   </p:cond>
                 </p:stCondLst>
@@ -3267,7 +3267,7 @@
                                       <p:cBhvr>
                                         <p:cTn id="12" dur="1" fill="hold"/>
                                         <p:tgtEl>
-                                          <p:spTgt spid="4"/>
+                                          <p:spTgt spid="5"/>
                                         </p:tgtEl>
                                       </p:cBhvr>
                                     </p:cmd>
@@ -3285,7 +3285,7 @@
               <p:nextCondLst>
                 <p:cond evt="onClick" delay="0">
                   <p:tgtEl>
-                    <p:spTgt spid="4"/>
+                    <p:spTgt spid="5"/>
                   </p:tgtEl>
                 </p:cond>
               </p:nextCondLst>

</xml_diff>